<commit_message>
20171226 portfolio homepage 추가, ebottles 호스팅 주소 변경
</commit_message>
<xml_diff>
--- a/신준태_이력서&포트폴리오.pptx
+++ b/신준태_이력서&포트폴리오.pptx
@@ -2,16 +2,16 @@
 <file path=ppt/presentation.xml><?xml version="1.0" encoding="utf-8"?>
 <p:presentation xmlns:a="http://schemas.openxmlformats.org/drawingml/2006/main" xmlns:r="http://schemas.openxmlformats.org/officeDocument/2006/relationships" xmlns:p="http://schemas.openxmlformats.org/presentationml/2006/main" xmlns:p14="http://schemas.microsoft.com/office/powerpoint/2010/main" embedTrueTypeFonts="1" saveSubsetFonts="1">
   <p:sldMasterIdLst>
-    <p:sldMasterId id="2147484384" r:id="rId68"/>
-    <p:sldMasterId id="2147484385" r:id="rId70"/>
-    <p:sldMasterId id="2147484386" r:id="rId72"/>
-    <p:sldMasterId id="2147484387" r:id="rId74"/>
-    <p:sldMasterId id="2147484388" r:id="rId76"/>
-    <p:sldMasterId id="2147484389" r:id="rId78"/>
-    <p:sldMasterId id="2147484390" r:id="rId80"/>
-    <p:sldMasterId id="2147484391" r:id="rId82"/>
-    <p:sldMasterId id="2147484392" r:id="rId84"/>
-    <p:sldMasterId id="2147484393" r:id="rId86"/>
+    <p:sldMasterId id="2147484414" r:id="rId68"/>
+    <p:sldMasterId id="2147484415" r:id="rId70"/>
+    <p:sldMasterId id="2147484416" r:id="rId72"/>
+    <p:sldMasterId id="2147484417" r:id="rId74"/>
+    <p:sldMasterId id="2147484418" r:id="rId76"/>
+    <p:sldMasterId id="2147484419" r:id="rId78"/>
+    <p:sldMasterId id="2147484420" r:id="rId80"/>
+    <p:sldMasterId id="2147484421" r:id="rId82"/>
+    <p:sldMasterId id="2147484422" r:id="rId84"/>
+    <p:sldMasterId id="2147484423" r:id="rId86"/>
   </p:sldMasterIdLst>
   <p:notesMasterIdLst>
     <p:notesMasterId r:id="rId90"/>
@@ -21,32 +21,32 @@
   </p:handoutMasterIdLst>
   <p:sldIdLst>
     <p:sldId id="290" r:id="rId92"/>
-    <p:sldId id="286" r:id="rId94"/>
-    <p:sldId id="291" r:id="rId95"/>
-    <p:sldId id="258" r:id="rId96"/>
-    <p:sldId id="277" r:id="rId97"/>
-    <p:sldId id="260" r:id="rId98"/>
-    <p:sldId id="292" r:id="rId100"/>
-    <p:sldId id="293" r:id="rId102"/>
-    <p:sldId id="294" r:id="rId104"/>
-    <p:sldId id="295" r:id="rId106"/>
-    <p:sldId id="296" r:id="rId108"/>
-    <p:sldId id="297" r:id="rId109"/>
-    <p:sldId id="298" r:id="rId111"/>
-    <p:sldId id="299" r:id="rId113"/>
-    <p:sldId id="300" r:id="rId115"/>
-    <p:sldId id="301" r:id="rId117"/>
-    <p:sldId id="302" r:id="rId119"/>
-    <p:sldId id="303" r:id="rId121"/>
-    <p:sldId id="304" r:id="rId123"/>
-    <p:sldId id="306" r:id="rId125"/>
-    <p:sldId id="305" r:id="rId126"/>
-    <p:sldId id="307" r:id="rId128"/>
-    <p:sldId id="308" r:id="rId130"/>
-    <p:sldId id="309" r:id="rId132"/>
-    <p:sldId id="310" r:id="rId134"/>
-    <p:sldId id="311" r:id="rId136"/>
-    <p:sldId id="271" r:id="rId138"/>
+    <p:sldId id="286" r:id="rId93"/>
+    <p:sldId id="291" r:id="rId94"/>
+    <p:sldId id="258" r:id="rId95"/>
+    <p:sldId id="277" r:id="rId96"/>
+    <p:sldId id="260" r:id="rId97"/>
+    <p:sldId id="292" r:id="rId99"/>
+    <p:sldId id="293" r:id="rId101"/>
+    <p:sldId id="294" r:id="rId103"/>
+    <p:sldId id="295" r:id="rId105"/>
+    <p:sldId id="296" r:id="rId107"/>
+    <p:sldId id="297" r:id="rId108"/>
+    <p:sldId id="298" r:id="rId110"/>
+    <p:sldId id="299" r:id="rId112"/>
+    <p:sldId id="300" r:id="rId113"/>
+    <p:sldId id="301" r:id="rId115"/>
+    <p:sldId id="302" r:id="rId117"/>
+    <p:sldId id="303" r:id="rId119"/>
+    <p:sldId id="304" r:id="rId121"/>
+    <p:sldId id="306" r:id="rId123"/>
+    <p:sldId id="305" r:id="rId124"/>
+    <p:sldId id="307" r:id="rId126"/>
+    <p:sldId id="308" r:id="rId128"/>
+    <p:sldId id="309" r:id="rId130"/>
+    <p:sldId id="310" r:id="rId132"/>
+    <p:sldId id="311" r:id="rId134"/>
+    <p:sldId id="271" r:id="rId136"/>
   </p:sldIdLst>
   <p:sldSz cx="9144000" cy="6858000"/>
   <p:notesSz cx="6797675" cy="9926955"/>
@@ -168,22 +168,22 @@
   <p:extLst>
     <p:ext uri="{EFAFB233-063F-42B5-8137-9DF3F51BA10A}">
       <p15:sldGuideLst xmlns:p15="http://schemas.microsoft.com/office/powerpoint/2012/main">
-        <p15:guide id="1" orient="horz" pos="4108" userDrawn="1">
+        <p15:guide id="1" orient="horz" pos="4107" userDrawn="1">
           <p15:clr>
             <a:srgbClr val="A4A3A4"/>
           </p15:clr>
         </p15:guide>
-        <p15:guide id="5" pos="267" userDrawn="1">
+        <p15:guide id="5" pos="266" userDrawn="1">
           <p15:clr>
             <a:srgbClr val="A4A3A4"/>
           </p15:clr>
         </p15:guide>
-        <p15:guide id="6" pos="5487" userDrawn="1">
+        <p15:guide id="6" pos="5486" userDrawn="1">
           <p15:clr>
             <a:srgbClr val="A4A3A4"/>
           </p15:clr>
         </p15:guide>
-        <p15:guide id="7" pos="1511" userDrawn="1">
+        <p15:guide id="7" pos="1510" userDrawn="1">
           <p15:clr>
             <a:srgbClr val="A4A3A4"/>
           </p15:clr>
@@ -20953,9 +20953,9 @@
           <p:nvPr/>
         </p:nvSpPr>
         <p:spPr>
-          <a:xfrm rot="0">
+          <a:xfrm>
             <a:off x="251460" y="5216525"/>
-            <a:ext cx="6769100" cy="1198880"/>
+            <a:ext cx="6769735" cy="1567815"/>
           </a:xfrm>
           <a:prstGeom prst="rect"/>
           <a:noFill/>
@@ -21019,17 +21019,7 @@
                 <a:latin typeface="맑은 고딕" charset="0"/>
                 <a:ea typeface="맑은 고딕" charset="0"/>
               </a:rPr>
-              <a:t>Email : </a:t>
-            </a:r>
-            <a:r>
-              <a:rPr lang="en-US" altLang="ko-KR" sz="1600" cap="none" dirty="0" smtClean="0" b="0">
-                <a:solidFill>
-                  <a:schemeClr val="bg1"/>
-                </a:solidFill>
-                <a:latin typeface="맑은 고딕" charset="0"/>
-                <a:ea typeface="맑은 고딕" charset="0"/>
-              </a:rPr>
-              <a:t>wnsxo0816@gmail.com</a:t>
+              <a:t>Email : wnsxo0816@gmail.com</a:t>
             </a:r>
             <a:endParaRPr lang="ko-KR" altLang="en-US" sz="1600" cap="none" dirty="0" smtClean="0" b="0">
               <a:solidFill>
@@ -21062,6 +21052,38 @@
                 <a:ea typeface="맑은 고딕" charset="0"/>
               </a:rPr>
               <a:t>Phone : 010-3950-3332</a:t>
+            </a:r>
+            <a:endParaRPr lang="ko-KR" altLang="en-US" sz="1600" cap="none" dirty="0" smtClean="0" b="0">
+              <a:solidFill>
+                <a:schemeClr val="bg1"/>
+              </a:solidFill>
+              <a:latin typeface="맑은 고딕" charset="0"/>
+              <a:ea typeface="맑은 고딕" charset="0"/>
+            </a:endParaRPr>
+          </a:p>
+          <a:p>
+            <a:pPr marL="0" indent="0" algn="l" fontAlgn="auto" defTabSz="914400" eaLnBrk="0">
+              <a:lnSpc>
+                <a:spcPct val="150000"/>
+              </a:lnSpc>
+              <a:spcBef>
+                <a:spcPts val="0"/>
+              </a:spcBef>
+              <a:spcAft>
+                <a:spcPts val="0"/>
+              </a:spcAft>
+              <a:buFontTx/>
+              <a:buNone/>
+            </a:pPr>
+            <a:r>
+              <a:rPr lang="en-US" altLang="ko-KR" sz="1600" cap="none" dirty="0" smtClean="0" b="0">
+                <a:solidFill>
+                  <a:schemeClr val="bg1"/>
+                </a:solidFill>
+                <a:latin typeface="맑은 고딕" charset="0"/>
+                <a:ea typeface="맑은 고딕" charset="0"/>
+              </a:rPr>
+              <a:t>Homepage : https://guyclops.github.io/portfolio/</a:t>
             </a:r>
             <a:endParaRPr lang="ko-KR" altLang="en-US" sz="1600" cap="none" dirty="0" smtClean="0" b="0">
               <a:solidFill>
@@ -29405,7 +29427,7 @@
         <p:spPr>
           <a:xfrm>
             <a:off x="2292985" y="4741545"/>
-            <a:ext cx="5681980" cy="1323975"/>
+            <a:ext cx="5682615" cy="1323975"/>
           </a:xfrm>
           <a:prstGeom prst="rect"/>
           <a:noFill/>
@@ -29555,7 +29577,7 @@
                 <a:latin typeface="맑은 고딕" charset="0"/>
                 <a:ea typeface="맑은 고딕" charset="0"/>
               </a:rPr>
-              <a:t>Hosting : http://ebottles.cafe24.com/</a:t>
+              <a:t>Hosting : http://ebottles.cf/</a:t>
             </a:r>
             <a:endParaRPr lang="ko-KR" altLang="en-US" sz="1600" cap="none" dirty="0" smtClean="0" b="1">
               <a:solidFill>
@@ -42295,7 +42317,7 @@
                           <a:latin typeface="맑은 고딕" charset="0"/>
                           <a:ea typeface="맑은 고딕" charset="0"/>
                         </a:rPr>
-                        <a:t>수료예정</a:t>
+                        <a:t>수료</a:t>
                       </a:r>
                       <a:endParaRPr lang="ko-KR" altLang="en-US" sz="1800" kern="1200" dirty="0" smtClean="0" cap="none" b="0">
                         <a:solidFill>

</xml_diff>